<commit_message>
Added Condition input to start screen
Added condition input to start screen
</commit_message>
<xml_diff>
--- a/Assets/StreamingAssets/2D_Objects/Practice/~Practice-Instructions.pptx
+++ b/Assets/StreamingAssets/2D_Objects/Practice/~Practice-Instructions.pptx
@@ -290,7 +290,7 @@
           <a:p>
             <a:fld id="{CA365A23-D275-4D5C-A163-A5AA11A9E6CE}" type="datetimeFigureOut">
               <a:rPr lang="en-US" smtClean="0"/>
-              <a:t>6/11/20</a:t>
+              <a:t>6/16/2020</a:t>
             </a:fld>
             <a:endParaRPr lang="en-US"/>
           </a:p>
@@ -488,7 +488,7 @@
           <a:p>
             <a:fld id="{CA365A23-D275-4D5C-A163-A5AA11A9E6CE}" type="datetimeFigureOut">
               <a:rPr lang="en-US" smtClean="0"/>
-              <a:t>6/11/20</a:t>
+              <a:t>6/16/2020</a:t>
             </a:fld>
             <a:endParaRPr lang="en-US"/>
           </a:p>
@@ -696,7 +696,7 @@
           <a:p>
             <a:fld id="{CA365A23-D275-4D5C-A163-A5AA11A9E6CE}" type="datetimeFigureOut">
               <a:rPr lang="en-US" smtClean="0"/>
-              <a:t>6/11/20</a:t>
+              <a:t>6/16/2020</a:t>
             </a:fld>
             <a:endParaRPr lang="en-US"/>
           </a:p>
@@ -894,7 +894,7 @@
           <a:p>
             <a:fld id="{CA365A23-D275-4D5C-A163-A5AA11A9E6CE}" type="datetimeFigureOut">
               <a:rPr lang="en-US" smtClean="0"/>
-              <a:t>6/11/20</a:t>
+              <a:t>6/16/2020</a:t>
             </a:fld>
             <a:endParaRPr lang="en-US"/>
           </a:p>
@@ -1169,7 +1169,7 @@
           <a:p>
             <a:fld id="{CA365A23-D275-4D5C-A163-A5AA11A9E6CE}" type="datetimeFigureOut">
               <a:rPr lang="en-US" smtClean="0"/>
-              <a:t>6/11/20</a:t>
+              <a:t>6/16/2020</a:t>
             </a:fld>
             <a:endParaRPr lang="en-US"/>
           </a:p>
@@ -1434,7 +1434,7 @@
           <a:p>
             <a:fld id="{CA365A23-D275-4D5C-A163-A5AA11A9E6CE}" type="datetimeFigureOut">
               <a:rPr lang="en-US" smtClean="0"/>
-              <a:t>6/11/20</a:t>
+              <a:t>6/16/2020</a:t>
             </a:fld>
             <a:endParaRPr lang="en-US"/>
           </a:p>
@@ -1846,7 +1846,7 @@
           <a:p>
             <a:fld id="{CA365A23-D275-4D5C-A163-A5AA11A9E6CE}" type="datetimeFigureOut">
               <a:rPr lang="en-US" smtClean="0"/>
-              <a:t>6/11/20</a:t>
+              <a:t>6/16/2020</a:t>
             </a:fld>
             <a:endParaRPr lang="en-US"/>
           </a:p>
@@ -1987,7 +1987,7 @@
           <a:p>
             <a:fld id="{CA365A23-D275-4D5C-A163-A5AA11A9E6CE}" type="datetimeFigureOut">
               <a:rPr lang="en-US" smtClean="0"/>
-              <a:t>6/11/20</a:t>
+              <a:t>6/16/2020</a:t>
             </a:fld>
             <a:endParaRPr lang="en-US"/>
           </a:p>
@@ -2100,7 +2100,7 @@
           <a:p>
             <a:fld id="{CA365A23-D275-4D5C-A163-A5AA11A9E6CE}" type="datetimeFigureOut">
               <a:rPr lang="en-US" smtClean="0"/>
-              <a:t>6/11/20</a:t>
+              <a:t>6/16/2020</a:t>
             </a:fld>
             <a:endParaRPr lang="en-US"/>
           </a:p>
@@ -2411,7 +2411,7 @@
           <a:p>
             <a:fld id="{CA365A23-D275-4D5C-A163-A5AA11A9E6CE}" type="datetimeFigureOut">
               <a:rPr lang="en-US" smtClean="0"/>
-              <a:t>6/11/20</a:t>
+              <a:t>6/16/2020</a:t>
             </a:fld>
             <a:endParaRPr lang="en-US"/>
           </a:p>
@@ -2699,7 +2699,7 @@
           <a:p>
             <a:fld id="{CA365A23-D275-4D5C-A163-A5AA11A9E6CE}" type="datetimeFigureOut">
               <a:rPr lang="en-US" smtClean="0"/>
-              <a:t>6/11/20</a:t>
+              <a:t>6/16/2020</a:t>
             </a:fld>
             <a:endParaRPr lang="en-US"/>
           </a:p>
@@ -2940,7 +2940,7 @@
           <a:p>
             <a:fld id="{CA365A23-D275-4D5C-A163-A5AA11A9E6CE}" type="datetimeFigureOut">
               <a:rPr lang="en-US" smtClean="0"/>
-              <a:t>6/11/20</a:t>
+              <a:t>6/16/2020</a:t>
             </a:fld>
             <a:endParaRPr lang="en-US"/>
           </a:p>
@@ -7182,7 +7182,7 @@
             <a:noFill/>
             <a:extLst>
               <a:ext uri="{909E8E84-426E-40dd-AFC4-6F175D3DCCD1}">
-                <a14:hiddenFill xmlns="" xmlns:a14="http://schemas.microsoft.com/office/drawing/2010/main">
+                <a14:hiddenFill xmlns:a14="http://schemas.microsoft.com/office/drawing/2010/main" xmlns="">
                   <a:solidFill>
                     <a:srgbClr val="FFFFFF"/>
                   </a:solidFill>
@@ -7227,7 +7227,7 @@
             <a:noFill/>
             <a:extLst>
               <a:ext uri="{909E8E84-426E-40dd-AFC4-6F175D3DCCD1}">
-                <a14:hiddenFill xmlns="" xmlns:a14="http://schemas.microsoft.com/office/drawing/2010/main">
+                <a14:hiddenFill xmlns:a14="http://schemas.microsoft.com/office/drawing/2010/main" xmlns="">
                   <a:solidFill>
                     <a:srgbClr val="FFFFFF"/>
                   </a:solidFill>
@@ -7272,7 +7272,7 @@
             <a:noFill/>
             <a:extLst>
               <a:ext uri="{909E8E84-426E-40dd-AFC4-6F175D3DCCD1}">
-                <a14:hiddenFill xmlns="" xmlns:a14="http://schemas.microsoft.com/office/drawing/2010/main">
+                <a14:hiddenFill xmlns:a14="http://schemas.microsoft.com/office/drawing/2010/main" xmlns="">
                   <a:solidFill>
                     <a:srgbClr val="FFFFFF"/>
                   </a:solidFill>
@@ -9033,11 +9033,11 @@
             </a:r>
             <a:r>
               <a:rPr lang="en-US" b="1" dirty="0"/>
-              <a:t>Participant ID</a:t>
+              <a:t>Participant ID, Condition, </a:t>
             </a:r>
             <a:r>
               <a:rPr lang="en-US" dirty="0"/>
-              <a:t> and </a:t>
+              <a:t>and </a:t>
             </a:r>
             <a:r>
               <a:rPr lang="en-US" b="1" dirty="0"/>
@@ -9504,7 +9504,7 @@
             <a:noFill/>
             <a:extLst>
               <a:ext uri="{909E8E84-426E-40dd-AFC4-6F175D3DCCD1}">
-                <a14:hiddenFill xmlns="" xmlns:a14="http://schemas.microsoft.com/office/drawing/2010/main">
+                <a14:hiddenFill xmlns:a14="http://schemas.microsoft.com/office/drawing/2010/main" xmlns="">
                   <a:solidFill>
                     <a:srgbClr val="FFFFFF"/>
                   </a:solidFill>
@@ -10715,7 +10715,7 @@
             <a:noFill/>
             <a:extLst>
               <a:ext uri="{909E8E84-426E-40dd-AFC4-6F175D3DCCD1}">
-                <a14:hiddenFill xmlns="" xmlns:a14="http://schemas.microsoft.com/office/drawing/2010/main">
+                <a14:hiddenFill xmlns:a14="http://schemas.microsoft.com/office/drawing/2010/main" xmlns="">
                   <a:solidFill>
                     <a:srgbClr val="FFFFFF"/>
                   </a:solidFill>
@@ -10760,7 +10760,7 @@
             <a:noFill/>
             <a:extLst>
               <a:ext uri="{909E8E84-426E-40dd-AFC4-6F175D3DCCD1}">
-                <a14:hiddenFill xmlns="" xmlns:a14="http://schemas.microsoft.com/office/drawing/2010/main">
+                <a14:hiddenFill xmlns:a14="http://schemas.microsoft.com/office/drawing/2010/main" xmlns="">
                   <a:solidFill>
                     <a:srgbClr val="FFFFFF"/>
                   </a:solidFill>
@@ -10805,7 +10805,7 @@
             <a:noFill/>
             <a:extLst>
               <a:ext uri="{909E8E84-426E-40dd-AFC4-6F175D3DCCD1}">
-                <a14:hiddenFill xmlns="" xmlns:a14="http://schemas.microsoft.com/office/drawing/2010/main">
+                <a14:hiddenFill xmlns:a14="http://schemas.microsoft.com/office/drawing/2010/main" xmlns="">
                   <a:solidFill>
                     <a:srgbClr val="FFFFFF"/>
                   </a:solidFill>

</xml_diff>

<commit_message>
Added Condition Field on start screen
</commit_message>
<xml_diff>
--- a/Assets/StreamingAssets/2D_Objects/Practice/~Practice-Instructions.pptx
+++ b/Assets/StreamingAssets/2D_Objects/Practice/~Practice-Instructions.pptx
@@ -290,7 +290,7 @@
           <a:p>
             <a:fld id="{CA365A23-D275-4D5C-A163-A5AA11A9E6CE}" type="datetimeFigureOut">
               <a:rPr lang="en-US" smtClean="0"/>
-              <a:t>6/11/20</a:t>
+              <a:t>6/16/2020</a:t>
             </a:fld>
             <a:endParaRPr lang="en-US"/>
           </a:p>
@@ -488,7 +488,7 @@
           <a:p>
             <a:fld id="{CA365A23-D275-4D5C-A163-A5AA11A9E6CE}" type="datetimeFigureOut">
               <a:rPr lang="en-US" smtClean="0"/>
-              <a:t>6/11/20</a:t>
+              <a:t>6/16/2020</a:t>
             </a:fld>
             <a:endParaRPr lang="en-US"/>
           </a:p>
@@ -696,7 +696,7 @@
           <a:p>
             <a:fld id="{CA365A23-D275-4D5C-A163-A5AA11A9E6CE}" type="datetimeFigureOut">
               <a:rPr lang="en-US" smtClean="0"/>
-              <a:t>6/11/20</a:t>
+              <a:t>6/16/2020</a:t>
             </a:fld>
             <a:endParaRPr lang="en-US"/>
           </a:p>
@@ -894,7 +894,7 @@
           <a:p>
             <a:fld id="{CA365A23-D275-4D5C-A163-A5AA11A9E6CE}" type="datetimeFigureOut">
               <a:rPr lang="en-US" smtClean="0"/>
-              <a:t>6/11/20</a:t>
+              <a:t>6/16/2020</a:t>
             </a:fld>
             <a:endParaRPr lang="en-US"/>
           </a:p>
@@ -1169,7 +1169,7 @@
           <a:p>
             <a:fld id="{CA365A23-D275-4D5C-A163-A5AA11A9E6CE}" type="datetimeFigureOut">
               <a:rPr lang="en-US" smtClean="0"/>
-              <a:t>6/11/20</a:t>
+              <a:t>6/16/2020</a:t>
             </a:fld>
             <a:endParaRPr lang="en-US"/>
           </a:p>
@@ -1434,7 +1434,7 @@
           <a:p>
             <a:fld id="{CA365A23-D275-4D5C-A163-A5AA11A9E6CE}" type="datetimeFigureOut">
               <a:rPr lang="en-US" smtClean="0"/>
-              <a:t>6/11/20</a:t>
+              <a:t>6/16/2020</a:t>
             </a:fld>
             <a:endParaRPr lang="en-US"/>
           </a:p>
@@ -1846,7 +1846,7 @@
           <a:p>
             <a:fld id="{CA365A23-D275-4D5C-A163-A5AA11A9E6CE}" type="datetimeFigureOut">
               <a:rPr lang="en-US" smtClean="0"/>
-              <a:t>6/11/20</a:t>
+              <a:t>6/16/2020</a:t>
             </a:fld>
             <a:endParaRPr lang="en-US"/>
           </a:p>
@@ -1987,7 +1987,7 @@
           <a:p>
             <a:fld id="{CA365A23-D275-4D5C-A163-A5AA11A9E6CE}" type="datetimeFigureOut">
               <a:rPr lang="en-US" smtClean="0"/>
-              <a:t>6/11/20</a:t>
+              <a:t>6/16/2020</a:t>
             </a:fld>
             <a:endParaRPr lang="en-US"/>
           </a:p>
@@ -2100,7 +2100,7 @@
           <a:p>
             <a:fld id="{CA365A23-D275-4D5C-A163-A5AA11A9E6CE}" type="datetimeFigureOut">
               <a:rPr lang="en-US" smtClean="0"/>
-              <a:t>6/11/20</a:t>
+              <a:t>6/16/2020</a:t>
             </a:fld>
             <a:endParaRPr lang="en-US"/>
           </a:p>
@@ -2411,7 +2411,7 @@
           <a:p>
             <a:fld id="{CA365A23-D275-4D5C-A163-A5AA11A9E6CE}" type="datetimeFigureOut">
               <a:rPr lang="en-US" smtClean="0"/>
-              <a:t>6/11/20</a:t>
+              <a:t>6/16/2020</a:t>
             </a:fld>
             <a:endParaRPr lang="en-US"/>
           </a:p>
@@ -2699,7 +2699,7 @@
           <a:p>
             <a:fld id="{CA365A23-D275-4D5C-A163-A5AA11A9E6CE}" type="datetimeFigureOut">
               <a:rPr lang="en-US" smtClean="0"/>
-              <a:t>6/11/20</a:t>
+              <a:t>6/16/2020</a:t>
             </a:fld>
             <a:endParaRPr lang="en-US"/>
           </a:p>
@@ -2940,7 +2940,7 @@
           <a:p>
             <a:fld id="{CA365A23-D275-4D5C-A163-A5AA11A9E6CE}" type="datetimeFigureOut">
               <a:rPr lang="en-US" smtClean="0"/>
-              <a:t>6/11/20</a:t>
+              <a:t>6/16/2020</a:t>
             </a:fld>
             <a:endParaRPr lang="en-US"/>
           </a:p>
@@ -7182,7 +7182,7 @@
             <a:noFill/>
             <a:extLst>
               <a:ext uri="{909E8E84-426E-40dd-AFC4-6F175D3DCCD1}">
-                <a14:hiddenFill xmlns="" xmlns:a14="http://schemas.microsoft.com/office/drawing/2010/main">
+                <a14:hiddenFill xmlns:a14="http://schemas.microsoft.com/office/drawing/2010/main" xmlns="">
                   <a:solidFill>
                     <a:srgbClr val="FFFFFF"/>
                   </a:solidFill>
@@ -7227,7 +7227,7 @@
             <a:noFill/>
             <a:extLst>
               <a:ext uri="{909E8E84-426E-40dd-AFC4-6F175D3DCCD1}">
-                <a14:hiddenFill xmlns="" xmlns:a14="http://schemas.microsoft.com/office/drawing/2010/main">
+                <a14:hiddenFill xmlns:a14="http://schemas.microsoft.com/office/drawing/2010/main" xmlns="">
                   <a:solidFill>
                     <a:srgbClr val="FFFFFF"/>
                   </a:solidFill>
@@ -7272,7 +7272,7 @@
             <a:noFill/>
             <a:extLst>
               <a:ext uri="{909E8E84-426E-40dd-AFC4-6F175D3DCCD1}">
-                <a14:hiddenFill xmlns="" xmlns:a14="http://schemas.microsoft.com/office/drawing/2010/main">
+                <a14:hiddenFill xmlns:a14="http://schemas.microsoft.com/office/drawing/2010/main" xmlns="">
                   <a:solidFill>
                     <a:srgbClr val="FFFFFF"/>
                   </a:solidFill>
@@ -9033,11 +9033,11 @@
             </a:r>
             <a:r>
               <a:rPr lang="en-US" b="1" dirty="0"/>
-              <a:t>Participant ID</a:t>
+              <a:t>Participant ID, Condition, </a:t>
             </a:r>
             <a:r>
               <a:rPr lang="en-US" dirty="0"/>
-              <a:t> and </a:t>
+              <a:t>and </a:t>
             </a:r>
             <a:r>
               <a:rPr lang="en-US" b="1" dirty="0"/>
@@ -9504,7 +9504,7 @@
             <a:noFill/>
             <a:extLst>
               <a:ext uri="{909E8E84-426E-40dd-AFC4-6F175D3DCCD1}">
-                <a14:hiddenFill xmlns="" xmlns:a14="http://schemas.microsoft.com/office/drawing/2010/main">
+                <a14:hiddenFill xmlns:a14="http://schemas.microsoft.com/office/drawing/2010/main" xmlns="">
                   <a:solidFill>
                     <a:srgbClr val="FFFFFF"/>
                   </a:solidFill>
@@ -10715,7 +10715,7 @@
             <a:noFill/>
             <a:extLst>
               <a:ext uri="{909E8E84-426E-40dd-AFC4-6F175D3DCCD1}">
-                <a14:hiddenFill xmlns="" xmlns:a14="http://schemas.microsoft.com/office/drawing/2010/main">
+                <a14:hiddenFill xmlns:a14="http://schemas.microsoft.com/office/drawing/2010/main" xmlns="">
                   <a:solidFill>
                     <a:srgbClr val="FFFFFF"/>
                   </a:solidFill>
@@ -10760,7 +10760,7 @@
             <a:noFill/>
             <a:extLst>
               <a:ext uri="{909E8E84-426E-40dd-AFC4-6F175D3DCCD1}">
-                <a14:hiddenFill xmlns="" xmlns:a14="http://schemas.microsoft.com/office/drawing/2010/main">
+                <a14:hiddenFill xmlns:a14="http://schemas.microsoft.com/office/drawing/2010/main" xmlns="">
                   <a:solidFill>
                     <a:srgbClr val="FFFFFF"/>
                   </a:solidFill>
@@ -10805,7 +10805,7 @@
             <a:noFill/>
             <a:extLst>
               <a:ext uri="{909E8E84-426E-40dd-AFC4-6F175D3DCCD1}">
-                <a14:hiddenFill xmlns="" xmlns:a14="http://schemas.microsoft.com/office/drawing/2010/main">
+                <a14:hiddenFill xmlns:a14="http://schemas.microsoft.com/office/drawing/2010/main" xmlns="">
                   <a:solidFill>
                     <a:srgbClr val="FFFFFF"/>
                   </a:solidFill>

</xml_diff>